<commit_message>
working on the slides
</commit_message>
<xml_diff>
--- a/02-MachineLearning/02-slides.pptx
+++ b/02-MachineLearning/02-slides.pptx
@@ -3748,7 +3748,7 @@
           <a:p>
             <a:fld id="{42AE2D9A-5B89-4689-B04D-3FBBAA04CE2B}" type="slidenum">
               <a:rPr lang="en-US" smtClean="0"/>
-              <a:t>‹#›</a:t>
+              <a:t>‹N›</a:t>
             </a:fld>
             <a:endParaRPr lang="en-US"/>
           </a:p>
@@ -4006,7 +4006,7 @@
           <a:p>
             <a:fld id="{D98EE9EE-A74D-4412-94DD-33E68A97493E}" type="slidenum">
               <a:rPr lang="it-IT" smtClean="0"/>
-              <a:t>‹#›</a:t>
+              <a:t>‹N›</a:t>
             </a:fld>
             <a:endParaRPr lang="it-IT"/>
           </a:p>
@@ -4939,7 +4939,7 @@
           <a:p>
             <a:fld id="{5DD6F1BA-2510-46FC-9346-AB1F3CA1593B}" type="slidenum">
               <a:rPr lang="it-IT" smtClean="0"/>
-              <a:t>‹#›</a:t>
+              <a:t>‹N›</a:t>
             </a:fld>
             <a:endParaRPr lang="it-IT"/>
           </a:p>
@@ -5208,7 +5208,7 @@
           <a:p>
             <a:fld id="{5DD6F1BA-2510-46FC-9346-AB1F3CA1593B}" type="slidenum">
               <a:rPr lang="it-IT" smtClean="0"/>
-              <a:t>‹#›</a:t>
+              <a:t>‹N›</a:t>
             </a:fld>
             <a:endParaRPr lang="it-IT"/>
           </a:p>
@@ -5392,7 +5392,7 @@
           <a:p>
             <a:fld id="{5DD6F1BA-2510-46FC-9346-AB1F3CA1593B}" type="slidenum">
               <a:rPr lang="it-IT" smtClean="0"/>
-              <a:t>‹#›</a:t>
+              <a:t>‹N›</a:t>
             </a:fld>
             <a:endParaRPr lang="it-IT"/>
           </a:p>
@@ -5581,7 +5581,7 @@
           <a:p>
             <a:fld id="{5DD6F1BA-2510-46FC-9346-AB1F3CA1593B}" type="slidenum">
               <a:rPr lang="it-IT" smtClean="0"/>
-              <a:t>‹#›</a:t>
+              <a:t>‹N›</a:t>
             </a:fld>
             <a:endParaRPr lang="it-IT"/>
           </a:p>
@@ -5762,7 +5762,7 @@
           <a:p>
             <a:fld id="{5DD6F1BA-2510-46FC-9346-AB1F3CA1593B}" type="slidenum">
               <a:rPr lang="it-IT" smtClean="0"/>
-              <a:t>‹#›</a:t>
+              <a:t>‹N›</a:t>
             </a:fld>
             <a:endParaRPr lang="it-IT"/>
           </a:p>
@@ -5981,7 +5981,7 @@
           <a:p>
             <a:fld id="{5DD6F1BA-2510-46FC-9346-AB1F3CA1593B}" type="slidenum">
               <a:rPr lang="it-IT" smtClean="0"/>
-              <a:t>‹#›</a:t>
+              <a:t>‹N›</a:t>
             </a:fld>
             <a:endParaRPr lang="it-IT"/>
           </a:p>
@@ -6170,7 +6170,7 @@
           <a:p>
             <a:fld id="{5DD6F1BA-2510-46FC-9346-AB1F3CA1593B}" type="slidenum">
               <a:rPr lang="it-IT" smtClean="0"/>
-              <a:t>‹#›</a:t>
+              <a:t>‹N›</a:t>
             </a:fld>
             <a:endParaRPr lang="it-IT"/>
           </a:p>
@@ -6526,7 +6526,7 @@
           <a:p>
             <a:fld id="{5DD6F1BA-2510-46FC-9346-AB1F3CA1593B}" type="slidenum">
               <a:rPr lang="it-IT" smtClean="0"/>
-              <a:t>‹#›</a:t>
+              <a:t>‹N›</a:t>
             </a:fld>
             <a:endParaRPr lang="it-IT"/>
           </a:p>
@@ -6773,7 +6773,7 @@
           <a:p>
             <a:fld id="{5DD6F1BA-2510-46FC-9346-AB1F3CA1593B}" type="slidenum">
               <a:rPr lang="it-IT" smtClean="0"/>
-              <a:t>‹#›</a:t>
+              <a:t>‹N›</a:t>
             </a:fld>
             <a:endParaRPr lang="it-IT"/>
           </a:p>
@@ -7201,7 +7201,7 @@
           <a:p>
             <a:fld id="{5DD6F1BA-2510-46FC-9346-AB1F3CA1593B}" type="slidenum">
               <a:rPr lang="it-IT" smtClean="0"/>
-              <a:t>‹#›</a:t>
+              <a:t>‹N›</a:t>
             </a:fld>
             <a:endParaRPr lang="it-IT"/>
           </a:p>
@@ -7325,7 +7325,7 @@
           <a:p>
             <a:fld id="{5DD6F1BA-2510-46FC-9346-AB1F3CA1593B}" type="slidenum">
               <a:rPr lang="it-IT" smtClean="0"/>
-              <a:t>‹#›</a:t>
+              <a:t>‹N›</a:t>
             </a:fld>
             <a:endParaRPr lang="it-IT"/>
           </a:p>
@@ -7446,7 +7446,7 @@
           <a:p>
             <a:fld id="{5DD6F1BA-2510-46FC-9346-AB1F3CA1593B}" type="slidenum">
               <a:rPr lang="it-IT" smtClean="0"/>
-              <a:t>‹#›</a:t>
+              <a:t>‹N›</a:t>
             </a:fld>
             <a:endParaRPr lang="it-IT"/>
           </a:p>
@@ -7699,7 +7699,7 @@
             <a:fld id="{5DD6F1BA-2510-46FC-9346-AB1F3CA1593B}" type="slidenum">
               <a:rPr lang="en-US" smtClean="0"/>
               <a:pPr/>
-              <a:t>‹#›</a:t>
+              <a:t>‹N›</a:t>
             </a:fld>
             <a:endParaRPr lang="en-US" dirty="0"/>
           </a:p>
@@ -9858,7 +9858,7 @@
             <a:pPr lvl="1"/>
             <a:r>
               <a:rPr lang="en-US" dirty="0"/>
-              <a:t>Accuracy can be used when the class distribution is similar while F1-score is a better metric when there are imbalanced classes</a:t>
+              <a:t>Accuracy can be used when the class distribution is similar, while F1-score is a better when there are imbalanced classes</a:t>
             </a:r>
           </a:p>
         </p:txBody>
@@ -9964,7 +9964,7 @@
         </p:blipFill>
         <p:spPr>
           <a:xfrm>
-            <a:off x="2526847" y="2341111"/>
+            <a:off x="2526847" y="2440864"/>
             <a:ext cx="1809750" cy="323850"/>
           </a:xfrm>
         </p:spPr>
@@ -10035,7 +10035,7 @@
         </p:blipFill>
         <p:spPr>
           <a:xfrm>
-            <a:off x="2552763" y="3315494"/>
+            <a:off x="2552763" y="3415247"/>
             <a:ext cx="1466850" cy="333375"/>
           </a:xfrm>
           <a:prstGeom prst="rect">
@@ -10074,7 +10074,7 @@
         </p:blipFill>
         <p:spPr>
           <a:xfrm>
-            <a:off x="2662300" y="1446894"/>
+            <a:off x="2662300" y="1546647"/>
             <a:ext cx="1247775" cy="676275"/>
           </a:xfrm>
           <a:prstGeom prst="rect">
@@ -11970,23 +11970,15 @@
             <a:pPr lvl="2"/>
             <a:r>
               <a:rPr lang="en-US" dirty="0"/>
-              <a:t>Dimensionality Reduction: reduce the number of attributes in data which can be further used for </a:t>
-            </a:r>
-            <a:r>
-              <a:rPr lang="en-US" dirty="0" err="1"/>
-              <a:t>summarisation</a:t>
+              <a:t>Dimensionality Reduction: reduce the number of attributes in data which can be further used for summarization</a:t>
+            </a:r>
+            <a:r>
+              <a:rPr lang="en-US"/>
+              <a:t>, visualization </a:t>
             </a:r>
             <a:r>
               <a:rPr lang="en-US" dirty="0"/>
-              <a:t>, </a:t>
-            </a:r>
-            <a:r>
-              <a:rPr lang="en-US" dirty="0" err="1"/>
-              <a:t>visualisation</a:t>
-            </a:r>
-            <a:r>
-              <a:rPr lang="en-US" dirty="0"/>
-              <a:t> and feature selection</a:t>
+              <a:t>and feature selection</a:t>
             </a:r>
           </a:p>
           <a:p>

</xml_diff>